<commit_message>
edited icons in final pres
</commit_message>
<xml_diff>
--- a/Final Presentation/La meets ML.pptx
+++ b/Final Presentation/La meets ML.pptx
@@ -1888,10 +1888,26 @@
         <a:lstStyle/>
         <a:p>
           <a:r>
-            <a:rPr lang="de-DE"/>
-            <a:t>Object orientation was difficult</a:t>
+            <a:rPr lang="de-DE" dirty="0" err="1"/>
+            <a:t>Object</a:t>
           </a:r>
-          <a:endParaRPr lang="en-US"/>
+          <a:r>
+            <a:rPr lang="de-DE" dirty="0"/>
+            <a:t> </a:t>
+          </a:r>
+          <a:r>
+            <a:rPr lang="de-DE" dirty="0" err="1"/>
+            <a:t>orientation</a:t>
+          </a:r>
+          <a:r>
+            <a:rPr lang="de-DE" dirty="0"/>
+            <a:t> was </a:t>
+          </a:r>
+          <a:r>
+            <a:rPr lang="de-DE" dirty="0" err="1"/>
+            <a:t>difficult</a:t>
+          </a:r>
+          <a:endParaRPr lang="en-US" dirty="0"/>
         </a:p>
       </dgm:t>
     </dgm:pt>
@@ -1977,14 +1993,12 @@
         <a:blipFill>
           <a:blip xmlns:r="http://schemas.openxmlformats.org/officeDocument/2006/relationships" r:embed="rId1">
             <a:extLst>
-              <a:ext uri="{28A0092B-C50C-407E-A947-70E740481C1C}">
-                <a14:useLocalDpi xmlns:a14="http://schemas.microsoft.com/office/drawing/2010/main" val="0"/>
-              </a:ext>
               <a:ext uri="{96DAC541-7B7A-43D3-8B79-37D633B846F1}">
                 <asvg:svgBlip xmlns:asvg="http://schemas.microsoft.com/office/drawing/2016/SVG/main" r:embed="rId2"/>
               </a:ext>
             </a:extLst>
           </a:blip>
+          <a:srcRect/>
           <a:stretch>
             <a:fillRect/>
           </a:stretch>
@@ -1995,7 +2009,7 @@
       </dgm:spPr>
       <dgm:extLst>
         <a:ext uri="{E40237B7-FDA0-4F09-8148-C483321AD2D9}">
-          <dgm14:cNvPr xmlns:dgm14="http://schemas.microsoft.com/office/drawing/2010/diagram" id="0" name="" descr="In Love Face with Solid Fill"/>
+          <dgm14:cNvPr xmlns:dgm14="http://schemas.microsoft.com/office/drawing/2010/diagram" id="0" name="" descr="USB"/>
         </a:ext>
       </dgm:extLst>
     </dgm:pt>
@@ -2030,14 +2044,12 @@
         <a:blipFill>
           <a:blip xmlns:r="http://schemas.openxmlformats.org/officeDocument/2006/relationships" r:embed="rId3">
             <a:extLst>
-              <a:ext uri="{28A0092B-C50C-407E-A947-70E740481C1C}">
-                <a14:useLocalDpi xmlns:a14="http://schemas.microsoft.com/office/drawing/2010/main" val="0"/>
-              </a:ext>
               <a:ext uri="{96DAC541-7B7A-43D3-8B79-37D633B846F1}">
                 <asvg:svgBlip xmlns:asvg="http://schemas.microsoft.com/office/drawing/2016/SVG/main" r:embed="rId4"/>
               </a:ext>
             </a:extLst>
           </a:blip>
+          <a:srcRect/>
           <a:stretch>
             <a:fillRect/>
           </a:stretch>
@@ -2048,7 +2060,7 @@
       </dgm:spPr>
       <dgm:extLst>
         <a:ext uri="{E40237B7-FDA0-4F09-8148-C483321AD2D9}">
-          <dgm14:cNvPr xmlns:dgm14="http://schemas.microsoft.com/office/drawing/2010/diagram" id="0" name="" descr="Medicine"/>
+          <dgm14:cNvPr xmlns:dgm14="http://schemas.microsoft.com/office/drawing/2010/diagram" id="0" name="" descr="Internet"/>
         </a:ext>
       </dgm:extLst>
     </dgm:pt>
@@ -2197,6 +2209,7 @@
               </a:ext>
             </a:extLst>
           </a:blip>
+          <a:srcRect/>
           <a:stretch>
             <a:fillRect/>
           </a:stretch>
@@ -2207,7 +2220,7 @@
       </dgm:spPr>
       <dgm:extLst>
         <a:ext uri="{E40237B7-FDA0-4F09-8148-C483321AD2D9}">
-          <dgm14:cNvPr xmlns:dgm14="http://schemas.microsoft.com/office/drawing/2010/diagram" id="0" name="" descr="Help"/>
+          <dgm14:cNvPr xmlns:dgm14="http://schemas.microsoft.com/office/drawing/2010/diagram" id="0" name="" descr="Server"/>
         </a:ext>
       </dgm:extLst>
     </dgm:pt>
@@ -2242,14 +2255,12 @@
         <a:blipFill>
           <a:blip xmlns:r="http://schemas.openxmlformats.org/officeDocument/2006/relationships" r:embed="rId11">
             <a:extLst>
-              <a:ext uri="{28A0092B-C50C-407E-A947-70E740481C1C}">
-                <a14:useLocalDpi xmlns:a14="http://schemas.microsoft.com/office/drawing/2010/main" val="0"/>
-              </a:ext>
               <a:ext uri="{96DAC541-7B7A-43D3-8B79-37D633B846F1}">
                 <asvg:svgBlip xmlns:asvg="http://schemas.microsoft.com/office/drawing/2016/SVG/main" r:embed="rId12"/>
               </a:ext>
             </a:extLst>
           </a:blip>
+          <a:srcRect/>
           <a:stretch>
             <a:fillRect/>
           </a:stretch>
@@ -2260,7 +2271,7 @@
       </dgm:spPr>
       <dgm:extLst>
         <a:ext uri="{E40237B7-FDA0-4F09-8148-C483321AD2D9}">
-          <dgm14:cNvPr xmlns:dgm14="http://schemas.microsoft.com/office/drawing/2010/diagram" id="0" name="" descr="Group of People"/>
+          <dgm14:cNvPr xmlns:dgm14="http://schemas.microsoft.com/office/drawing/2010/diagram" id="0" name="" descr="Zahnrad"/>
         </a:ext>
       </dgm:extLst>
     </dgm:pt>
@@ -2519,14 +2530,12 @@
         <a:blipFill>
           <a:blip xmlns:r="http://schemas.openxmlformats.org/officeDocument/2006/relationships" r:embed="rId1">
             <a:extLst>
-              <a:ext uri="{28A0092B-C50C-407E-A947-70E740481C1C}">
-                <a14:useLocalDpi xmlns:a14="http://schemas.microsoft.com/office/drawing/2010/main" val="0"/>
-              </a:ext>
               <a:ext uri="{96DAC541-7B7A-43D3-8B79-37D633B846F1}">
                 <asvg:svgBlip xmlns:asvg="http://schemas.microsoft.com/office/drawing/2016/SVG/main" r:embed="rId2"/>
               </a:ext>
             </a:extLst>
           </a:blip>
+          <a:srcRect/>
           <a:stretch>
             <a:fillRect/>
           </a:stretch>
@@ -2537,7 +2546,7 @@
       </dgm:spPr>
       <dgm:extLst>
         <a:ext uri="{E40237B7-FDA0-4F09-8148-C483321AD2D9}">
-          <dgm14:cNvPr xmlns:dgm14="http://schemas.microsoft.com/office/drawing/2010/diagram" id="0" name="" descr="Venn Diagram"/>
+          <dgm14:cNvPr xmlns:dgm14="http://schemas.microsoft.com/office/drawing/2010/diagram" id="0" name="" descr="Aufwärtstrend"/>
         </a:ext>
       </dgm:extLst>
     </dgm:pt>
@@ -2752,7 +2761,7 @@
   <dgm:whole/>
   <dgm:extLst>
     <a:ext uri="http://schemas.microsoft.com/office/drawing/2008/diagram">
-      <dsp:dataModelExt xmlns:dsp="http://schemas.microsoft.com/office/drawing/2008/diagram" relId="rId6" minVer="http://schemas.openxmlformats.org/drawingml/2006/diagram"/>
+      <dsp:dataModelExt xmlns:dsp="http://schemas.microsoft.com/office/drawing/2008/diagram" relId="rId7" minVer="http://schemas.openxmlformats.org/drawingml/2006/diagram"/>
     </a:ext>
   </dgm:extLst>
 </dgm:dataModel>
@@ -2824,14 +2833,12 @@
         <a:blipFill>
           <a:blip xmlns:r="http://schemas.openxmlformats.org/officeDocument/2006/relationships" r:embed="rId1">
             <a:extLst>
-              <a:ext uri="{28A0092B-C50C-407E-A947-70E740481C1C}">
-                <a14:useLocalDpi xmlns:a14="http://schemas.microsoft.com/office/drawing/2010/main" val="0"/>
-              </a:ext>
               <a:ext uri="{96DAC541-7B7A-43D3-8B79-37D633B846F1}">
                 <asvg:svgBlip xmlns:asvg="http://schemas.microsoft.com/office/drawing/2016/SVG/main" r:embed="rId2"/>
               </a:ext>
             </a:extLst>
           </a:blip>
+          <a:srcRect/>
           <a:stretch>
             <a:fillRect/>
           </a:stretch>
@@ -2975,14 +2982,12 @@
         <a:blipFill>
           <a:blip xmlns:r="http://schemas.openxmlformats.org/officeDocument/2006/relationships" r:embed="rId3">
             <a:extLst>
-              <a:ext uri="{28A0092B-C50C-407E-A947-70E740481C1C}">
-                <a14:useLocalDpi xmlns:a14="http://schemas.microsoft.com/office/drawing/2010/main" val="0"/>
-              </a:ext>
               <a:ext uri="{96DAC541-7B7A-43D3-8B79-37D633B846F1}">
                 <asvg:svgBlip xmlns:asvg="http://schemas.microsoft.com/office/drawing/2016/SVG/main" r:embed="rId4"/>
               </a:ext>
             </a:extLst>
           </a:blip>
+          <a:srcRect/>
           <a:stretch>
             <a:fillRect/>
           </a:stretch>
@@ -3436,6 +3441,7 @@
               </a:ext>
             </a:extLst>
           </a:blip>
+          <a:srcRect/>
           <a:stretch>
             <a:fillRect/>
           </a:stretch>
@@ -3510,10 +3516,26 @@
             <a:buNone/>
           </a:pPr>
           <a:r>
-            <a:rPr lang="de-DE" sz="1900" kern="1200"/>
-            <a:t>Object orientation was difficult</a:t>
+            <a:rPr lang="de-DE" sz="1900" kern="1200" dirty="0" err="1"/>
+            <a:t>Object</a:t>
           </a:r>
-          <a:endParaRPr lang="en-US" sz="1900" kern="1200"/>
+          <a:r>
+            <a:rPr lang="de-DE" sz="1900" kern="1200" dirty="0"/>
+            <a:t> </a:t>
+          </a:r>
+          <a:r>
+            <a:rPr lang="de-DE" sz="1900" kern="1200" dirty="0" err="1"/>
+            <a:t>orientation</a:t>
+          </a:r>
+          <a:r>
+            <a:rPr lang="de-DE" sz="1900" kern="1200" dirty="0"/>
+            <a:t> was </a:t>
+          </a:r>
+          <a:r>
+            <a:rPr lang="de-DE" sz="1900" kern="1200" dirty="0" err="1"/>
+            <a:t>difficult</a:t>
+          </a:r>
+          <a:endParaRPr lang="en-US" sz="1900" kern="1200" dirty="0"/>
         </a:p>
       </dsp:txBody>
       <dsp:txXfrm>
@@ -3579,14 +3601,12 @@
         <a:blipFill>
           <a:blip xmlns:r="http://schemas.openxmlformats.org/officeDocument/2006/relationships" r:embed="rId11">
             <a:extLst>
-              <a:ext uri="{28A0092B-C50C-407E-A947-70E740481C1C}">
-                <a14:useLocalDpi xmlns:a14="http://schemas.microsoft.com/office/drawing/2010/main" val="0"/>
-              </a:ext>
               <a:ext uri="{96DAC541-7B7A-43D3-8B79-37D633B846F1}">
                 <asvg:svgBlip xmlns:asvg="http://schemas.microsoft.com/office/drawing/2016/SVG/main" r:embed="rId12"/>
               </a:ext>
             </a:extLst>
           </a:blip>
+          <a:srcRect/>
           <a:stretch>
             <a:fillRect/>
           </a:stretch>
@@ -3742,14 +3762,12 @@
         <a:blipFill>
           <a:blip xmlns:r="http://schemas.openxmlformats.org/officeDocument/2006/relationships" r:embed="rId1">
             <a:extLst>
-              <a:ext uri="{28A0092B-C50C-407E-A947-70E740481C1C}">
-                <a14:useLocalDpi xmlns:a14="http://schemas.microsoft.com/office/drawing/2010/main" val="0"/>
-              </a:ext>
               <a:ext uri="{96DAC541-7B7A-43D3-8B79-37D633B846F1}">
                 <asvg:svgBlip xmlns:asvg="http://schemas.microsoft.com/office/drawing/2016/SVG/main" r:embed="rId2"/>
               </a:ext>
             </a:extLst>
           </a:blip>
+          <a:srcRect/>
           <a:stretch>
             <a:fillRect/>
           </a:stretch>
@@ -7881,9 +7899,23 @@
           <a:bodyPr/>
           <a:lstStyle/>
           <a:p>
+            <a:pPr marL="171450" indent="-171450">
+              <a:buFont typeface="Arial" panose="020B0604020202020204" pitchFamily="34" charset="0"/>
+              <a:buChar char="•"/>
+            </a:pPr>
             <a:r>
               <a:rPr lang="en-US" dirty="0"/>
               <a:t>others= config and build-setup files</a:t>
+            </a:r>
+          </a:p>
+          <a:p>
+            <a:pPr marL="171450" indent="-171450">
+              <a:buFont typeface="Arial" panose="020B0604020202020204" pitchFamily="34" charset="0"/>
+              <a:buChar char="•"/>
+            </a:pPr>
+            <a:r>
+              <a:rPr lang="en-US" dirty="0"/>
+              <a:t>Overall. 900 commits</a:t>
             </a:r>
           </a:p>
         </p:txBody>
@@ -7947,6 +7979,356 @@
 </file>
 
 <file path=ppt/notesSlides/notesSlide12.xml><?xml version="1.0" encoding="utf-8"?>
+<p:notes xmlns:a="http://schemas.openxmlformats.org/drawingml/2006/main" xmlns:r="http://schemas.openxmlformats.org/officeDocument/2006/relationships" xmlns:p="http://schemas.openxmlformats.org/presentationml/2006/main">
+  <p:cSld>
+    <p:spTree>
+      <p:nvGrpSpPr>
+        <p:cNvPr id="1" name=""/>
+        <p:cNvGrpSpPr/>
+        <p:nvPr/>
+      </p:nvGrpSpPr>
+      <p:grpSpPr>
+        <a:xfrm>
+          <a:off x="0" y="0"/>
+          <a:ext cx="0" cy="0"/>
+          <a:chOff x="0" y="0"/>
+          <a:chExt cx="0" cy="0"/>
+        </a:xfrm>
+      </p:grpSpPr>
+      <p:sp>
+        <p:nvSpPr>
+          <p:cNvPr id="2" name="Folienbildplatzhalter 1"/>
+          <p:cNvSpPr>
+            <a:spLocks noGrp="1" noRot="1" noChangeAspect="1"/>
+          </p:cNvSpPr>
+          <p:nvPr>
+            <p:ph type="sldImg"/>
+          </p:nvPr>
+        </p:nvSpPr>
+        <p:spPr/>
+      </p:sp>
+      <p:sp>
+        <p:nvSpPr>
+          <p:cNvPr id="3" name="Notizenplatzhalter 2"/>
+          <p:cNvSpPr>
+            <a:spLocks noGrp="1"/>
+          </p:cNvSpPr>
+          <p:nvPr>
+            <p:ph type="body" idx="1"/>
+          </p:nvPr>
+        </p:nvSpPr>
+        <p:spPr/>
+        <p:txBody>
+          <a:bodyPr/>
+          <a:lstStyle/>
+          <a:p>
+            <a:r>
+              <a:rPr lang="en-US" dirty="0"/>
+              <a:t>Commit rate increased in January -&gt; start of the implementation phase and quality assurance</a:t>
+            </a:r>
+          </a:p>
+        </p:txBody>
+      </p:sp>
+      <p:sp>
+        <p:nvSpPr>
+          <p:cNvPr id="4" name="Fußzeilenplatzhalter 3"/>
+          <p:cNvSpPr>
+            <a:spLocks noGrp="1"/>
+          </p:cNvSpPr>
+          <p:nvPr>
+            <p:ph type="ftr" sz="quarter" idx="4"/>
+          </p:nvPr>
+        </p:nvSpPr>
+        <p:spPr/>
+        <p:txBody>
+          <a:bodyPr/>
+          <a:lstStyle/>
+          <a:p>
+            <a:r>
+              <a:rPr lang="de-DE"/>
+              <a:t>Fabian Koffer, Simon Hanselmann, Yannick Funk, Dennis Leon Grötzinger, Anna Ricker</a:t>
+            </a:r>
+          </a:p>
+        </p:txBody>
+      </p:sp>
+      <p:sp>
+        <p:nvSpPr>
+          <p:cNvPr id="5" name="Foliennummernplatzhalter 4"/>
+          <p:cNvSpPr>
+            <a:spLocks noGrp="1"/>
+          </p:cNvSpPr>
+          <p:nvPr>
+            <p:ph type="sldNum" sz="quarter" idx="5"/>
+          </p:nvPr>
+        </p:nvSpPr>
+        <p:spPr/>
+        <p:txBody>
+          <a:bodyPr/>
+          <a:lstStyle/>
+          <a:p>
+            <a:fld id="{CA04F272-B815-443A-A9C1-BA10F9533513}" type="slidenum">
+              <a:rPr lang="de-DE" smtClean="0"/>
+              <a:t>19</a:t>
+            </a:fld>
+            <a:endParaRPr lang="de-DE"/>
+          </a:p>
+        </p:txBody>
+      </p:sp>
+    </p:spTree>
+    <p:extLst>
+      <p:ext uri="{BB962C8B-B14F-4D97-AF65-F5344CB8AC3E}">
+        <p14:creationId xmlns:p14="http://schemas.microsoft.com/office/powerpoint/2010/main" val="1961905670"/>
+      </p:ext>
+    </p:extLst>
+  </p:cSld>
+  <p:clrMapOvr>
+    <a:masterClrMapping/>
+  </p:clrMapOvr>
+</p:notes>
+</file>
+
+<file path=ppt/notesSlides/notesSlide13.xml><?xml version="1.0" encoding="utf-8"?>
+<p:notes xmlns:a="http://schemas.openxmlformats.org/drawingml/2006/main" xmlns:r="http://schemas.openxmlformats.org/officeDocument/2006/relationships" xmlns:p="http://schemas.openxmlformats.org/presentationml/2006/main">
+  <p:cSld>
+    <p:spTree>
+      <p:nvGrpSpPr>
+        <p:cNvPr id="1" name=""/>
+        <p:cNvGrpSpPr/>
+        <p:nvPr/>
+      </p:nvGrpSpPr>
+      <p:grpSpPr>
+        <a:xfrm>
+          <a:off x="0" y="0"/>
+          <a:ext cx="0" cy="0"/>
+          <a:chOff x="0" y="0"/>
+          <a:chExt cx="0" cy="0"/>
+        </a:xfrm>
+      </p:grpSpPr>
+      <p:sp>
+        <p:nvSpPr>
+          <p:cNvPr id="2" name="Folienbildplatzhalter 1"/>
+          <p:cNvSpPr>
+            <a:spLocks noGrp="1" noRot="1" noChangeAspect="1"/>
+          </p:cNvSpPr>
+          <p:nvPr>
+            <p:ph type="sldImg"/>
+          </p:nvPr>
+        </p:nvSpPr>
+        <p:spPr/>
+      </p:sp>
+      <p:sp>
+        <p:nvSpPr>
+          <p:cNvPr id="3" name="Notizenplatzhalter 2"/>
+          <p:cNvSpPr>
+            <a:spLocks noGrp="1"/>
+          </p:cNvSpPr>
+          <p:nvPr>
+            <p:ph type="body" idx="1"/>
+          </p:nvPr>
+        </p:nvSpPr>
+        <p:spPr/>
+        <p:txBody>
+          <a:bodyPr/>
+          <a:lstStyle/>
+          <a:p>
+            <a:pPr marL="0" indent="0">
+              <a:buFont typeface="Arial" panose="020B0604020202020204" pitchFamily="34" charset="0"/>
+              <a:buNone/>
+            </a:pPr>
+            <a:r>
+              <a:rPr lang="de-DE" dirty="0" err="1"/>
+              <a:t>Following</a:t>
+            </a:r>
+            <a:r>
+              <a:rPr lang="de-DE" dirty="0"/>
+              <a:t> </a:t>
+            </a:r>
+            <a:r>
+              <a:rPr lang="de-DE" dirty="0" err="1"/>
+              <a:t>steps</a:t>
+            </a:r>
+            <a:r>
+              <a:rPr lang="de-DE" dirty="0"/>
+              <a:t>:</a:t>
+            </a:r>
+          </a:p>
+          <a:p>
+            <a:pPr marL="171450" indent="-171450">
+              <a:buFont typeface="Arial" panose="020B0604020202020204" pitchFamily="34" charset="0"/>
+              <a:buChar char="•"/>
+            </a:pPr>
+            <a:r>
+              <a:rPr lang="de-DE" dirty="0"/>
+              <a:t>Data </a:t>
+            </a:r>
+            <a:r>
+              <a:rPr lang="de-DE" dirty="0" err="1"/>
+              <a:t>we</a:t>
+            </a:r>
+            <a:r>
+              <a:rPr lang="de-DE" dirty="0"/>
+              <a:t> </a:t>
+            </a:r>
+            <a:r>
+              <a:rPr lang="de-DE" dirty="0" err="1"/>
+              <a:t>got</a:t>
+            </a:r>
+            <a:r>
+              <a:rPr lang="de-DE" dirty="0"/>
+              <a:t> out </a:t>
+            </a:r>
+            <a:r>
+              <a:rPr lang="de-DE" dirty="0" err="1"/>
+              <a:t>of</a:t>
+            </a:r>
+            <a:r>
+              <a:rPr lang="de-DE" dirty="0"/>
+              <a:t> </a:t>
+            </a:r>
+            <a:r>
+              <a:rPr lang="de-DE" dirty="0" err="1"/>
+              <a:t>the</a:t>
+            </a:r>
+            <a:r>
+              <a:rPr lang="de-DE" dirty="0"/>
+              <a:t> </a:t>
+            </a:r>
+            <a:r>
+              <a:rPr lang="de-DE" dirty="0" err="1"/>
+              <a:t>labeler</a:t>
+            </a:r>
+            <a:r>
+              <a:rPr lang="de-DE" dirty="0"/>
+              <a:t> </a:t>
+            </a:r>
+            <a:r>
+              <a:rPr lang="de-DE" dirty="0" err="1"/>
+              <a:t>to</a:t>
+            </a:r>
+            <a:r>
+              <a:rPr lang="de-DE" dirty="0"/>
+              <a:t> </a:t>
+            </a:r>
+            <a:r>
+              <a:rPr lang="de-DE" dirty="0" err="1"/>
+              <a:t>get</a:t>
+            </a:r>
+            <a:r>
+              <a:rPr lang="de-DE" dirty="0"/>
+              <a:t> a </a:t>
+            </a:r>
+            <a:r>
+              <a:rPr lang="de-DE" dirty="0" err="1"/>
+              <a:t>better</a:t>
+            </a:r>
+            <a:r>
+              <a:rPr lang="de-DE" dirty="0"/>
+              <a:t> NN</a:t>
+            </a:r>
+          </a:p>
+          <a:p>
+            <a:pPr marL="171450" indent="-171450">
+              <a:buFont typeface="Arial" panose="020B0604020202020204" pitchFamily="34" charset="0"/>
+              <a:buChar char="•"/>
+            </a:pPr>
+            <a:r>
+              <a:rPr lang="de-DE" dirty="0" err="1"/>
+              <a:t>Preconditioner</a:t>
+            </a:r>
+            <a:r>
+              <a:rPr lang="de-DE" dirty="0"/>
+              <a:t>/</a:t>
+            </a:r>
+            <a:r>
+              <a:rPr lang="de-DE" dirty="0" err="1"/>
+              <a:t>solver</a:t>
+            </a:r>
+            <a:r>
+              <a:rPr lang="de-DE" dirty="0"/>
+              <a:t> </a:t>
+            </a:r>
+            <a:r>
+              <a:rPr lang="de-DE" dirty="0" err="1"/>
+              <a:t>combination</a:t>
+            </a:r>
+            <a:endParaRPr lang="de-DE" dirty="0"/>
+          </a:p>
+          <a:p>
+            <a:pPr marL="171450" indent="-171450">
+              <a:buFont typeface="Arial" panose="020B0604020202020204" pitchFamily="34" charset="0"/>
+              <a:buChar char="•"/>
+            </a:pPr>
+            <a:r>
+              <a:rPr lang="en-GB" dirty="0" err="1"/>
+              <a:t>seperate</a:t>
+            </a:r>
+            <a:r>
+              <a:rPr lang="en-GB" dirty="0"/>
+              <a:t> neural networks for each size -&gt; </a:t>
+            </a:r>
+            <a:endParaRPr lang="en-US" dirty="0"/>
+          </a:p>
+        </p:txBody>
+      </p:sp>
+      <p:sp>
+        <p:nvSpPr>
+          <p:cNvPr id="4" name="Fußzeilenplatzhalter 3"/>
+          <p:cNvSpPr>
+            <a:spLocks noGrp="1"/>
+          </p:cNvSpPr>
+          <p:nvPr>
+            <p:ph type="ftr" sz="quarter" idx="4"/>
+          </p:nvPr>
+        </p:nvSpPr>
+        <p:spPr/>
+        <p:txBody>
+          <a:bodyPr/>
+          <a:lstStyle/>
+          <a:p>
+            <a:r>
+              <a:rPr lang="de-DE"/>
+              <a:t>Fabian Koffer, Simon Hanselmann, Yannick Funk, Dennis Leon Grötzinger, Anna Ricker</a:t>
+            </a:r>
+          </a:p>
+        </p:txBody>
+      </p:sp>
+      <p:sp>
+        <p:nvSpPr>
+          <p:cNvPr id="5" name="Foliennummernplatzhalter 4"/>
+          <p:cNvSpPr>
+            <a:spLocks noGrp="1"/>
+          </p:cNvSpPr>
+          <p:nvPr>
+            <p:ph type="sldNum" sz="quarter" idx="5"/>
+          </p:nvPr>
+        </p:nvSpPr>
+        <p:spPr/>
+        <p:txBody>
+          <a:bodyPr/>
+          <a:lstStyle/>
+          <a:p>
+            <a:fld id="{CA04F272-B815-443A-A9C1-BA10F9533513}" type="slidenum">
+              <a:rPr lang="de-DE" smtClean="0"/>
+              <a:t>20</a:t>
+            </a:fld>
+            <a:endParaRPr lang="de-DE"/>
+          </a:p>
+        </p:txBody>
+      </p:sp>
+    </p:spTree>
+    <p:extLst>
+      <p:ext uri="{BB962C8B-B14F-4D97-AF65-F5344CB8AC3E}">
+        <p14:creationId xmlns:p14="http://schemas.microsoft.com/office/powerpoint/2010/main" val="3065879523"/>
+      </p:ext>
+    </p:extLst>
+  </p:cSld>
+  <p:clrMapOvr>
+    <a:masterClrMapping/>
+  </p:clrMapOvr>
+</p:notes>
+</file>
+
+<file path=ppt/notesSlides/notesSlide14.xml><?xml version="1.0" encoding="utf-8"?>
 <p:notes xmlns:a="http://schemas.openxmlformats.org/drawingml/2006/main" xmlns:r="http://schemas.openxmlformats.org/officeDocument/2006/relationships" xmlns:p="http://schemas.openxmlformats.org/presentationml/2006/main">
   <p:cSld>
     <p:spTree>
@@ -16194,7 +16576,7 @@
             <p:ph idx="1"/>
             <p:extLst>
               <p:ext uri="{D42A27DB-BD31-4B8C-83A1-F6EECF244321}">
-                <p14:modId xmlns:p14="http://schemas.microsoft.com/office/powerpoint/2010/main" val="1872615011"/>
+                <p14:modId xmlns:p14="http://schemas.microsoft.com/office/powerpoint/2010/main" val="2491514188"/>
               </p:ext>
             </p:extLst>
           </p:nvPr>
@@ -16287,7 +16669,7 @@
         <p:spPr>
           <a:xfrm>
             <a:off x="838200" y="1825625"/>
-            <a:ext cx="3175000" cy="4351338"/>
+            <a:ext cx="3764280" cy="4351338"/>
           </a:xfrm>
         </p:spPr>
         <p:txBody>
@@ -16315,19 +16697,19 @@
           <a:p>
             <a:r>
               <a:rPr lang="de-DE" dirty="0"/>
-              <a:t>Python code: 2451</a:t>
+              <a:t>Python code: 2500</a:t>
             </a:r>
           </a:p>
           <a:p>
             <a:r>
               <a:rPr lang="de-DE" dirty="0"/>
-              <a:t>C++ code: 209</a:t>
+              <a:t>C++ code: 200</a:t>
             </a:r>
           </a:p>
           <a:p>
             <a:r>
               <a:rPr lang="en-US" dirty="0"/>
-              <a:t>others: 192</a:t>
+              <a:t>others: 200</a:t>
             </a:r>
           </a:p>
           <a:p>
@@ -16853,7 +17235,7 @@
           <p:nvPr/>
         </p:nvPicPr>
         <p:blipFill>
-          <a:blip r:embed="rId2"/>
+          <a:blip r:embed="rId3"/>
           <a:stretch>
             <a:fillRect/>
           </a:stretch>
@@ -17773,7 +18155,7 @@
             <p:ph idx="1"/>
             <p:extLst>
               <p:ext uri="{D42A27DB-BD31-4B8C-83A1-F6EECF244321}">
-                <p14:modId xmlns:p14="http://schemas.microsoft.com/office/powerpoint/2010/main" val="4232140265"/>
+                <p14:modId xmlns:p14="http://schemas.microsoft.com/office/powerpoint/2010/main" val="122322262"/>
               </p:ext>
             </p:extLst>
           </p:nvPr>
@@ -17784,7 +18166,7 @@
         </p:xfrm>
         <a:graphic>
           <a:graphicData uri="http://schemas.openxmlformats.org/drawingml/2006/diagram">
-            <dgm:relIds xmlns:dgm="http://schemas.openxmlformats.org/drawingml/2006/diagram" xmlns:r="http://schemas.openxmlformats.org/officeDocument/2006/relationships" r:dm="rId2" r:lo="rId3" r:qs="rId4" r:cs="rId5"/>
+            <dgm:relIds xmlns:dgm="http://schemas.openxmlformats.org/drawingml/2006/diagram" xmlns:r="http://schemas.openxmlformats.org/officeDocument/2006/relationships" r:dm="rId3" r:lo="rId4" r:qs="rId5" r:cs="rId6"/>
           </a:graphicData>
         </a:graphic>
       </p:graphicFrame>

</xml_diff>

<commit_message>
changed outlook to prospect
</commit_message>
<xml_diff>
--- a/Final Presentation/La meets ML.pptx
+++ b/Final Presentation/La meets ML.pptx
@@ -8264,11 +8264,7 @@
             </a:r>
             <a:r>
               <a:rPr lang="en-GB" dirty="0"/>
-              <a:t> neural networks for each size </a:t>
-            </a:r>
-            <a:r>
-              <a:rPr lang="en-GB"/>
-              <a:t>-&gt; make training independent from matrix size</a:t>
+              <a:t> neural networks for each size -&gt; make training independent from matrix size</a:t>
             </a:r>
             <a:endParaRPr lang="en-US" dirty="0"/>
           </a:p>
@@ -18026,12 +18022,12 @@
           <a:lstStyle/>
           <a:p>
             <a:r>
-              <a:rPr lang="en-US">
+              <a:rPr lang="en-US" dirty="0">
                 <a:solidFill>
                   <a:srgbClr val="FFFFFF"/>
                 </a:solidFill>
               </a:rPr>
-              <a:t>Outlook</a:t>
+              <a:t>Prospect</a:t>
             </a:r>
           </a:p>
         </p:txBody>

</xml_diff>

<commit_message>
edited traing module and classifier slides
</commit_message>
<xml_diff>
--- a/Final Presentation/La meets ML.pptx
+++ b/Final Presentation/La meets ML.pptx
@@ -148,6 +148,14 @@
     </p:extLst>
   </p:cmAuthor>
 </p:cmAuthorLst>
+</file>
+
+<file path=ppt/revisionInfo.xml><?xml version="1.0" encoding="utf-8"?>
+<p1510:revInfo xmlns:a="http://schemas.openxmlformats.org/drawingml/2006/main" xmlns:r="http://schemas.openxmlformats.org/officeDocument/2006/relationships" xmlns:p1510="http://schemas.microsoft.com/office/powerpoint/2015/10/main">
+  <p1510:revLst>
+    <p1510:client id="{F1738E0B-10FE-4512-B3C4-8D9081131403}" v="64" dt="2019-03-19T07:42:18.491"/>
+  </p1510:revLst>
+</p1510:revInfo>
 </file>
 
 <file path=ppt/diagrams/colors1.xml><?xml version="1.0" encoding="utf-8"?>
@@ -7056,7 +7064,7 @@
           <a:p>
             <a:fld id="{3C88CB10-1076-4101-A44A-CA91DC524357}" type="datetimeFigureOut">
               <a:rPr lang="en-US" smtClean="0"/>
-              <a:t>3/18/2019</a:t>
+              <a:t>3/19/2019</a:t>
             </a:fld>
             <a:endParaRPr lang="en-US"/>
           </a:p>
@@ -7237,7 +7245,7 @@
           <a:p>
             <a:fld id="{3CEC165E-15F5-4935-BBD1-A9D451E9120B}" type="datetimeFigureOut">
               <a:rPr lang="de-DE" smtClean="0"/>
-              <a:t>18.03.2019</a:t>
+              <a:t>19.03.2019</a:t>
             </a:fld>
             <a:endParaRPr lang="de-DE"/>
           </a:p>
@@ -15447,12 +15455,72 @@
           </a:p>
         </p:txBody>
       </p:sp>
+      <p:pic>
+        <p:nvPicPr>
+          <p:cNvPr id="4" name="Grafik 4">
+            <a:extLst>
+              <a:ext uri="{FF2B5EF4-FFF2-40B4-BE49-F238E27FC236}">
+                <a16:creationId xmlns:a16="http://schemas.microsoft.com/office/drawing/2014/main" id="{08C95A70-A27E-4C76-A67B-66C0AAFD896F}"/>
+              </a:ext>
+            </a:extLst>
+          </p:cNvPr>
+          <p:cNvPicPr>
+            <a:picLocks noChangeAspect="1"/>
+          </p:cNvPicPr>
+          <p:nvPr/>
+        </p:nvPicPr>
+        <p:blipFill>
+          <a:blip r:embed="rId2"/>
+          <a:stretch>
+            <a:fillRect/>
+          </a:stretch>
+        </p:blipFill>
+        <p:spPr>
+          <a:xfrm>
+            <a:off x="4598773" y="1921187"/>
+            <a:ext cx="2743200" cy="795528"/>
+          </a:xfrm>
+          <a:prstGeom prst="rect">
+            <a:avLst/>
+          </a:prstGeom>
+        </p:spPr>
+      </p:pic>
+      <p:pic>
+        <p:nvPicPr>
+          <p:cNvPr id="6" name="Grafik 6" descr="Ein Bild, das grün enthält.&#10;&#10;Mit hoher Zuverlässigkeit generierte Beschreibung">
+            <a:extLst>
+              <a:ext uri="{FF2B5EF4-FFF2-40B4-BE49-F238E27FC236}">
+                <a16:creationId xmlns:a16="http://schemas.microsoft.com/office/drawing/2014/main" id="{B444ABB9-1517-4F04-987E-54B48BE3EF15}"/>
+              </a:ext>
+            </a:extLst>
+          </p:cNvPr>
+          <p:cNvPicPr>
+            <a:picLocks noChangeAspect="1"/>
+          </p:cNvPicPr>
+          <p:nvPr/>
+        </p:nvPicPr>
+        <p:blipFill>
+          <a:blip r:embed="rId3"/>
+          <a:stretch>
+            <a:fillRect/>
+          </a:stretch>
+        </p:blipFill>
+        <p:spPr>
+          <a:xfrm>
+            <a:off x="1037968" y="2834534"/>
+            <a:ext cx="2743200" cy="2486390"/>
+          </a:xfrm>
+          <a:prstGeom prst="rect">
+            <a:avLst/>
+          </a:prstGeom>
+        </p:spPr>
+      </p:pic>
       <p:sp>
         <p:nvSpPr>
-          <p:cNvPr id="3" name="Textfeld 2">
+          <p:cNvPr id="10" name="Textfeld 9">
             <a:extLst>
               <a:ext uri="{FF2B5EF4-FFF2-40B4-BE49-F238E27FC236}">
-                <a16:creationId xmlns:a16="http://schemas.microsoft.com/office/drawing/2014/main" id="{717D8D97-B1F8-4CD6-B8EA-5CA564F5B994}"/>
+                <a16:creationId xmlns:a16="http://schemas.microsoft.com/office/drawing/2014/main" id="{1720B01D-D3EF-4FA3-B1EA-F905C2A00913}"/>
               </a:ext>
             </a:extLst>
           </p:cNvPr>
@@ -15460,36 +15528,161 @@
           <p:nvPr/>
         </p:nvSpPr>
         <p:spPr>
-          <a:xfrm>
-            <a:off x="838200" y="1769661"/>
-            <a:ext cx="1260858" cy="954107"/>
+          <a:xfrm rot="-5340000">
+            <a:off x="2201562" y="3509318"/>
+            <a:ext cx="2743200" cy="369332"/>
           </a:xfrm>
           <a:prstGeom prst="rect">
             <a:avLst/>
           </a:prstGeom>
-          <a:noFill/>
         </p:spPr>
         <p:txBody>
-          <a:bodyPr wrap="none" rtlCol="0">
+          <a:bodyPr rot="0" spcFirstLastPara="0" vertOverflow="overflow" horzOverflow="overflow" vert="horz" wrap="square" lIns="91440" tIns="45720" rIns="91440" bIns="45720" numCol="1" spcCol="0" rtlCol="0" fromWordArt="0" anchor="t" anchorCtr="0" forceAA="0" compatLnSpc="1">
+            <a:prstTxWarp prst="textNoShape">
+              <a:avLst/>
+            </a:prstTxWarp>
             <a:spAutoFit/>
           </a:bodyPr>
           <a:lstStyle/>
           <a:p>
             <a:r>
-              <a:rPr lang="en-US" sz="2800" dirty="0"/>
-              <a:t>Tools:</a:t>
-            </a:r>
-          </a:p>
-          <a:p>
-            <a:pPr marL="285750" indent="-285750">
-              <a:buFont typeface="Arial" panose="020B0604020202020204" pitchFamily="34" charset="0"/>
-              <a:buChar char="•"/>
-            </a:pPr>
-            <a:r>
-              <a:rPr lang="en-US" sz="2800" dirty="0" err="1"/>
-              <a:t>Keras</a:t>
-            </a:r>
-            <a:endParaRPr lang="en-US" sz="2800" dirty="0"/>
+              <a:rPr lang="de-DE" dirty="0">
+                <a:cs typeface="Calibri"/>
+              </a:rPr>
+              <a:t>Fastest Solver</a:t>
+            </a:r>
+          </a:p>
+        </p:txBody>
+      </p:sp>
+      <p:pic>
+        <p:nvPicPr>
+          <p:cNvPr id="3" name="Grafik 4">
+            <a:extLst>
+              <a:ext uri="{FF2B5EF4-FFF2-40B4-BE49-F238E27FC236}">
+                <a16:creationId xmlns:a16="http://schemas.microsoft.com/office/drawing/2014/main" id="{8995E77C-BBAE-4DF9-AFBF-EF05A230ED20}"/>
+              </a:ext>
+            </a:extLst>
+          </p:cNvPr>
+          <p:cNvPicPr>
+            <a:picLocks noChangeAspect="1"/>
+          </p:cNvPicPr>
+          <p:nvPr/>
+        </p:nvPicPr>
+        <p:blipFill>
+          <a:blip r:embed="rId4"/>
+          <a:stretch>
+            <a:fillRect/>
+          </a:stretch>
+        </p:blipFill>
+        <p:spPr>
+          <a:xfrm>
+            <a:off x="4524375" y="2707809"/>
+            <a:ext cx="2743200" cy="2509183"/>
+          </a:xfrm>
+          <a:prstGeom prst="rect">
+            <a:avLst/>
+          </a:prstGeom>
+        </p:spPr>
+      </p:pic>
+      <p:sp>
+        <p:nvSpPr>
+          <p:cNvPr id="7" name="Pfeil: nach rechts 6">
+            <a:extLst>
+              <a:ext uri="{FF2B5EF4-FFF2-40B4-BE49-F238E27FC236}">
+                <a16:creationId xmlns:a16="http://schemas.microsoft.com/office/drawing/2014/main" id="{5A71C770-25D5-4423-9C32-B4350BC53BFC}"/>
+              </a:ext>
+            </a:extLst>
+          </p:cNvPr>
+          <p:cNvSpPr/>
+          <p:nvPr/>
+        </p:nvSpPr>
+        <p:spPr>
+          <a:xfrm>
+            <a:off x="3692271" y="3729609"/>
+            <a:ext cx="978408" cy="484632"/>
+          </a:xfrm>
+          <a:prstGeom prst="rightArrow">
+            <a:avLst/>
+          </a:prstGeom>
+          <a:solidFill>
+            <a:schemeClr val="tx1"/>
+          </a:solidFill>
+        </p:spPr>
+        <p:style>
+          <a:lnRef idx="2">
+            <a:schemeClr val="accent1">
+              <a:shade val="50000"/>
+            </a:schemeClr>
+          </a:lnRef>
+          <a:fillRef idx="1">
+            <a:schemeClr val="accent1"/>
+          </a:fillRef>
+          <a:effectRef idx="0">
+            <a:schemeClr val="accent1"/>
+          </a:effectRef>
+          <a:fontRef idx="minor">
+            <a:schemeClr val="lt1"/>
+          </a:fontRef>
+        </p:style>
+        <p:txBody>
+          <a:bodyPr rtlCol="0" anchor="ctr"/>
+          <a:lstStyle/>
+          <a:p>
+            <a:pPr algn="ctr"/>
+            <a:endParaRPr lang="de-DE"/>
+          </a:p>
+        </p:txBody>
+      </p:sp>
+      <p:sp>
+        <p:nvSpPr>
+          <p:cNvPr id="11" name="Pfeil: nach links gekrümmt 10">
+            <a:extLst>
+              <a:ext uri="{FF2B5EF4-FFF2-40B4-BE49-F238E27FC236}">
+                <a16:creationId xmlns:a16="http://schemas.microsoft.com/office/drawing/2014/main" id="{4229CE6B-5D73-499B-8A0B-CB50A6B6C10A}"/>
+              </a:ext>
+            </a:extLst>
+          </p:cNvPr>
+          <p:cNvSpPr/>
+          <p:nvPr/>
+        </p:nvSpPr>
+        <p:spPr>
+          <a:xfrm>
+            <a:off x="7073265" y="3354324"/>
+            <a:ext cx="731520" cy="1216152"/>
+          </a:xfrm>
+          <a:prstGeom prst="curvedLeftArrow">
+            <a:avLst/>
+          </a:prstGeom>
+          <a:solidFill>
+            <a:schemeClr val="tx1"/>
+          </a:solidFill>
+        </p:spPr>
+        <p:style>
+          <a:lnRef idx="2">
+            <a:schemeClr val="accent1">
+              <a:shade val="50000"/>
+            </a:schemeClr>
+          </a:lnRef>
+          <a:fillRef idx="1">
+            <a:schemeClr val="accent1"/>
+          </a:fillRef>
+          <a:effectRef idx="0">
+            <a:schemeClr val="accent1"/>
+          </a:effectRef>
+          <a:fontRef idx="minor">
+            <a:schemeClr val="lt1"/>
+          </a:fontRef>
+        </p:style>
+        <p:txBody>
+          <a:bodyPr rtlCol="0" anchor="ctr"/>
+          <a:lstStyle/>
+          <a:p>
+            <a:pPr algn="ctr"/>
+            <a:endParaRPr lang="de-DE">
+              <a:solidFill>
+                <a:schemeClr val="tx1"/>
+              </a:solidFill>
+            </a:endParaRPr>
           </a:p>
         </p:txBody>
       </p:sp>
@@ -15640,11 +15833,280 @@
         </p:blipFill>
         <p:spPr>
           <a:xfrm>
-            <a:off x="8284698" y="250824"/>
+            <a:off x="9065748" y="250824"/>
             <a:ext cx="2743200" cy="6277513"/>
           </a:xfrm>
         </p:spPr>
       </p:pic>
+      <p:pic>
+        <p:nvPicPr>
+          <p:cNvPr id="3" name="Grafik 4">
+            <a:extLst>
+              <a:ext uri="{FF2B5EF4-FFF2-40B4-BE49-F238E27FC236}">
+                <a16:creationId xmlns:a16="http://schemas.microsoft.com/office/drawing/2014/main" id="{57A49D15-9434-442A-B0C2-949945313823}"/>
+              </a:ext>
+            </a:extLst>
+          </p:cNvPr>
+          <p:cNvPicPr>
+            <a:picLocks noChangeAspect="1"/>
+          </p:cNvPicPr>
+          <p:nvPr/>
+        </p:nvPicPr>
+        <p:blipFill>
+          <a:blip r:embed="rId3"/>
+          <a:stretch>
+            <a:fillRect/>
+          </a:stretch>
+        </p:blipFill>
+        <p:spPr>
+          <a:xfrm>
+            <a:off x="4598773" y="1921187"/>
+            <a:ext cx="2743200" cy="795528"/>
+          </a:xfrm>
+          <a:prstGeom prst="rect">
+            <a:avLst/>
+          </a:prstGeom>
+        </p:spPr>
+      </p:pic>
+      <p:pic>
+        <p:nvPicPr>
+          <p:cNvPr id="4" name="Grafik 6" descr="Ein Bild, das grün enthält.&#10;&#10;Mit hoher Zuverlässigkeit generierte Beschreibung">
+            <a:extLst>
+              <a:ext uri="{FF2B5EF4-FFF2-40B4-BE49-F238E27FC236}">
+                <a16:creationId xmlns:a16="http://schemas.microsoft.com/office/drawing/2014/main" id="{C9F92556-8E50-460F-AAD7-756439036E13}"/>
+              </a:ext>
+            </a:extLst>
+          </p:cNvPr>
+          <p:cNvPicPr>
+            <a:picLocks noChangeAspect="1"/>
+          </p:cNvPicPr>
+          <p:nvPr/>
+        </p:nvPicPr>
+        <p:blipFill>
+          <a:blip r:embed="rId4"/>
+          <a:stretch>
+            <a:fillRect/>
+          </a:stretch>
+        </p:blipFill>
+        <p:spPr>
+          <a:xfrm>
+            <a:off x="1037968" y="2834534"/>
+            <a:ext cx="2743200" cy="2486390"/>
+          </a:xfrm>
+          <a:prstGeom prst="rect">
+            <a:avLst/>
+          </a:prstGeom>
+        </p:spPr>
+      </p:pic>
+      <p:sp>
+        <p:nvSpPr>
+          <p:cNvPr id="5" name="Textfeld 4">
+            <a:extLst>
+              <a:ext uri="{FF2B5EF4-FFF2-40B4-BE49-F238E27FC236}">
+                <a16:creationId xmlns:a16="http://schemas.microsoft.com/office/drawing/2014/main" id="{13909133-6126-4757-82ED-11A5ADB7B609}"/>
+              </a:ext>
+            </a:extLst>
+          </p:cNvPr>
+          <p:cNvSpPr txBox="1"/>
+          <p:nvPr/>
+        </p:nvSpPr>
+        <p:spPr>
+          <a:xfrm rot="16260000">
+            <a:off x="2201562" y="3509318"/>
+            <a:ext cx="2743200" cy="369332"/>
+          </a:xfrm>
+          <a:prstGeom prst="rect">
+            <a:avLst/>
+          </a:prstGeom>
+        </p:spPr>
+        <p:txBody>
+          <a:bodyPr rot="0" spcFirstLastPara="0" vertOverflow="overflow" horzOverflow="overflow" vert="horz" wrap="square" lIns="91440" tIns="45720" rIns="91440" bIns="45720" numCol="1" spcCol="0" rtlCol="0" fromWordArt="0" anchor="t" anchorCtr="0" forceAA="0" compatLnSpc="1">
+            <a:prstTxWarp prst="textNoShape">
+              <a:avLst/>
+            </a:prstTxWarp>
+            <a:spAutoFit/>
+          </a:bodyPr>
+          <a:lstStyle/>
+          <a:p>
+            <a:endParaRPr lang="de-DE" dirty="0">
+              <a:cs typeface="Calibri"/>
+            </a:endParaRPr>
+          </a:p>
+        </p:txBody>
+      </p:sp>
+      <p:pic>
+        <p:nvPicPr>
+          <p:cNvPr id="13" name="Grafik 4" descr="Ein Bild, das Briefpapier enthält.&#10;&#10;Mit hoher Zuverlässigkeit generierte Beschreibung">
+            <a:extLst>
+              <a:ext uri="{FF2B5EF4-FFF2-40B4-BE49-F238E27FC236}">
+                <a16:creationId xmlns:a16="http://schemas.microsoft.com/office/drawing/2014/main" id="{CD2E69F9-1AD1-4A30-98E0-B94CC9B495F7}"/>
+              </a:ext>
+            </a:extLst>
+          </p:cNvPr>
+          <p:cNvPicPr>
+            <a:picLocks noChangeAspect="1"/>
+          </p:cNvPicPr>
+          <p:nvPr/>
+        </p:nvPicPr>
+        <p:blipFill>
+          <a:blip r:embed="rId5"/>
+          <a:stretch>
+            <a:fillRect/>
+          </a:stretch>
+        </p:blipFill>
+        <p:spPr>
+          <a:xfrm>
+            <a:off x="4524375" y="2707809"/>
+            <a:ext cx="2743200" cy="2509183"/>
+          </a:xfrm>
+          <a:prstGeom prst="rect">
+            <a:avLst/>
+          </a:prstGeom>
+        </p:spPr>
+      </p:pic>
+      <p:sp>
+        <p:nvSpPr>
+          <p:cNvPr id="15" name="Pfeil: nach rechts 14">
+            <a:extLst>
+              <a:ext uri="{FF2B5EF4-FFF2-40B4-BE49-F238E27FC236}">
+                <a16:creationId xmlns:a16="http://schemas.microsoft.com/office/drawing/2014/main" id="{F00ADBD7-867B-48D0-A634-B601F981E946}"/>
+              </a:ext>
+            </a:extLst>
+          </p:cNvPr>
+          <p:cNvSpPr/>
+          <p:nvPr/>
+        </p:nvSpPr>
+        <p:spPr>
+          <a:xfrm>
+            <a:off x="3692271" y="3729609"/>
+            <a:ext cx="978408" cy="484632"/>
+          </a:xfrm>
+          <a:prstGeom prst="rightArrow">
+            <a:avLst/>
+          </a:prstGeom>
+          <a:solidFill>
+            <a:schemeClr val="tx1"/>
+          </a:solidFill>
+        </p:spPr>
+        <p:style>
+          <a:lnRef idx="2">
+            <a:schemeClr val="accent1">
+              <a:shade val="50000"/>
+            </a:schemeClr>
+          </a:lnRef>
+          <a:fillRef idx="1">
+            <a:schemeClr val="accent1"/>
+          </a:fillRef>
+          <a:effectRef idx="0">
+            <a:schemeClr val="accent1"/>
+          </a:effectRef>
+          <a:fontRef idx="minor">
+            <a:schemeClr val="lt1"/>
+          </a:fontRef>
+        </p:style>
+        <p:txBody>
+          <a:bodyPr rtlCol="0" anchor="ctr"/>
+          <a:lstStyle/>
+          <a:p>
+            <a:pPr algn="ctr"/>
+            <a:endParaRPr lang="de-DE"/>
+          </a:p>
+        </p:txBody>
+      </p:sp>
+      <p:sp>
+        <p:nvSpPr>
+          <p:cNvPr id="18" name="Pfeil: nach rechts 17">
+            <a:extLst>
+              <a:ext uri="{FF2B5EF4-FFF2-40B4-BE49-F238E27FC236}">
+                <a16:creationId xmlns:a16="http://schemas.microsoft.com/office/drawing/2014/main" id="{52826443-F1C2-49AD-80E1-5ED7E661FA64}"/>
+              </a:ext>
+            </a:extLst>
+          </p:cNvPr>
+          <p:cNvSpPr/>
+          <p:nvPr/>
+        </p:nvSpPr>
+        <p:spPr>
+          <a:xfrm>
+            <a:off x="6978396" y="3729609"/>
+            <a:ext cx="302133" cy="484632"/>
+          </a:xfrm>
+          <a:prstGeom prst="rightArrow">
+            <a:avLst/>
+          </a:prstGeom>
+          <a:solidFill>
+            <a:schemeClr val="tx1"/>
+          </a:solidFill>
+        </p:spPr>
+        <p:style>
+          <a:lnRef idx="2">
+            <a:schemeClr val="accent1">
+              <a:shade val="50000"/>
+            </a:schemeClr>
+          </a:lnRef>
+          <a:fillRef idx="1">
+            <a:schemeClr val="accent1"/>
+          </a:fillRef>
+          <a:effectRef idx="0">
+            <a:schemeClr val="accent1"/>
+          </a:effectRef>
+          <a:fontRef idx="minor">
+            <a:schemeClr val="lt1"/>
+          </a:fontRef>
+        </p:style>
+        <p:txBody>
+          <a:bodyPr rtlCol="0" anchor="ctr"/>
+          <a:lstStyle/>
+          <a:p>
+            <a:pPr algn="ctr"/>
+            <a:endParaRPr lang="de-DE"/>
+          </a:p>
+        </p:txBody>
+      </p:sp>
+      <p:sp>
+        <p:nvSpPr>
+          <p:cNvPr id="19" name="Textfeld 18">
+            <a:extLst>
+              <a:ext uri="{FF2B5EF4-FFF2-40B4-BE49-F238E27FC236}">
+                <a16:creationId xmlns:a16="http://schemas.microsoft.com/office/drawing/2014/main" id="{4E2E1BFD-D149-44AA-BAF8-09B545DB18CF}"/>
+              </a:ext>
+            </a:extLst>
+          </p:cNvPr>
+          <p:cNvSpPr txBox="1"/>
+          <p:nvPr/>
+        </p:nvSpPr>
+        <p:spPr>
+          <a:xfrm>
+            <a:off x="7200900" y="3800475"/>
+            <a:ext cx="2743200" cy="369332"/>
+          </a:xfrm>
+          <a:prstGeom prst="rect">
+            <a:avLst/>
+          </a:prstGeom>
+        </p:spPr>
+        <p:txBody>
+          <a:bodyPr rot="0" spcFirstLastPara="0" vertOverflow="overflow" horzOverflow="overflow" vert="horz" wrap="square" lIns="91440" tIns="45720" rIns="91440" bIns="45720" numCol="1" spcCol="0" rtlCol="0" fromWordArt="0" anchor="t" anchorCtr="0" forceAA="0" compatLnSpc="1">
+            <a:prstTxWarp prst="textNoShape">
+              <a:avLst/>
+            </a:prstTxWarp>
+            <a:spAutoFit/>
+          </a:bodyPr>
+          <a:lstStyle/>
+          <a:p>
+            <a:r>
+              <a:rPr lang="de-DE" dirty="0">
+                <a:cs typeface="Calibri"/>
+              </a:rPr>
+              <a:t>Fastest </a:t>
+            </a:r>
+            <a:r>
+              <a:rPr lang="de-DE" dirty="0" err="1">
+                <a:cs typeface="Calibri"/>
+              </a:rPr>
+              <a:t>solver</a:t>
+            </a:r>
+          </a:p>
+        </p:txBody>
+      </p:sp>
     </p:spTree>
     <p:extLst>
       <p:ext uri="{BB962C8B-B14F-4D97-AF65-F5344CB8AC3E}">

</xml_diff>